<commit_message>
rebuilding site 2019年10月14日 星期一 14时11分27秒 CST
</commit_message>
<xml_diff>
--- a/public/images/logo.pptx
+++ b/public/images/logo.pptx
@@ -6,9 +6,10 @@
   </p:sldMasterIdLst>
   <p:sldIdLst>
     <p:sldId id="259" r:id="rId2"/>
-    <p:sldId id="260" r:id="rId3"/>
-    <p:sldId id="256" r:id="rId4"/>
-    <p:sldId id="257" r:id="rId5"/>
+    <p:sldId id="261" r:id="rId3"/>
+    <p:sldId id="260" r:id="rId4"/>
+    <p:sldId id="256" r:id="rId5"/>
+    <p:sldId id="257" r:id="rId6"/>
   </p:sldIdLst>
   <p:sldSz cx="9144000" cy="5715000" type="screen16x10"/>
   <p:notesSz cx="6858000" cy="9144000"/>
@@ -109,7 +110,7 @@
   </p:defaultTextStyle>
   <p:extLst>
     <p:ext uri="{EFAFB233-063F-42B5-8137-9DF3F51BA10A}">
-      <p15:sldGuideLst xmlns:p15="http://schemas.microsoft.com/office/powerpoint/2012/main" xmlns="">
+      <p15:sldGuideLst xmlns="" xmlns:p15="http://schemas.microsoft.com/office/powerpoint/2012/main">
         <p15:guide id="1" orient="horz" pos="1800">
           <p15:clr>
             <a:srgbClr val="A4A3A4"/>
@@ -3250,31 +3251,8 @@
                   <a:ea typeface="Microsoft YaHei"/>
                   <a:cs typeface="Microsoft YaHei"/>
                 </a:rPr>
-                <a:t>计算传播学</a:t>
+                <a:t>计算传播学研究委员会</a:t>
               </a:r>
-              <a:r>
-                <a:rPr kumimoji="1" lang="zh-CN" altLang="en-US" sz="4800" dirty="0" smtClean="0">
-                  <a:solidFill>
-                    <a:schemeClr val="bg1">
-                      <a:lumMod val="50000"/>
-                    </a:schemeClr>
-                  </a:solidFill>
-                  <a:latin typeface="Microsoft YaHei"/>
-                  <a:ea typeface="Microsoft YaHei"/>
-                  <a:cs typeface="Microsoft YaHei"/>
-                </a:rPr>
-                <a:t>研究委员会</a:t>
-              </a:r>
-              <a:endParaRPr kumimoji="1" lang="zh-CN" altLang="en-US" sz="4800" dirty="0" smtClean="0">
-                <a:solidFill>
-                  <a:schemeClr val="bg1">
-                    <a:lumMod val="50000"/>
-                  </a:schemeClr>
-                </a:solidFill>
-                <a:latin typeface="Microsoft YaHei"/>
-                <a:ea typeface="Microsoft YaHei"/>
-                <a:cs typeface="Microsoft YaHei"/>
-              </a:endParaRPr>
             </a:p>
             <a:p>
               <a:pPr algn="ctr"/>
@@ -3387,6 +3365,66 @@
       </p:grpSpPr>
       <p:pic>
         <p:nvPicPr>
+          <p:cNvPr id="2" name="图片 1" descr="logo.pdf"/>
+          <p:cNvPicPr>
+            <a:picLocks noChangeAspect="1"/>
+          </p:cNvPicPr>
+          <p:nvPr/>
+        </p:nvPicPr>
+        <p:blipFill>
+          <a:blip r:embed="rId2">
+            <a:extLst>
+              <a:ext uri="{28A0092B-C50C-407E-A947-70E740481C1C}">
+                <a14:useLocalDpi xmlns:a14="http://schemas.microsoft.com/office/drawing/2010/main" val="0"/>
+              </a:ext>
+            </a:extLst>
+          </a:blip>
+          <a:stretch>
+            <a:fillRect/>
+          </a:stretch>
+        </p:blipFill>
+        <p:spPr>
+          <a:xfrm>
+            <a:off x="546100" y="2006600"/>
+            <a:ext cx="8051800" cy="1689100"/>
+          </a:xfrm>
+          <a:prstGeom prst="rect">
+            <a:avLst/>
+          </a:prstGeom>
+        </p:spPr>
+      </p:pic>
+    </p:spTree>
+    <p:extLst>
+      <p:ext uri="{BB962C8B-B14F-4D97-AF65-F5344CB8AC3E}">
+        <p14:creationId xmlns:p14="http://schemas.microsoft.com/office/powerpoint/2010/main" val="3686909114"/>
+      </p:ext>
+    </p:extLst>
+  </p:cSld>
+  <p:clrMapOvr>
+    <a:masterClrMapping/>
+  </p:clrMapOvr>
+</p:sld>
+</file>
+
+<file path=ppt/slides/slide3.xml><?xml version="1.0" encoding="utf-8"?>
+<p:sld xmlns:a="http://schemas.openxmlformats.org/drawingml/2006/main" xmlns:r="http://schemas.openxmlformats.org/officeDocument/2006/relationships" xmlns:p="http://schemas.openxmlformats.org/presentationml/2006/main">
+  <p:cSld>
+    <p:spTree>
+      <p:nvGrpSpPr>
+        <p:cNvPr id="1" name=""/>
+        <p:cNvGrpSpPr/>
+        <p:nvPr/>
+      </p:nvGrpSpPr>
+      <p:grpSpPr>
+        <a:xfrm>
+          <a:off x="0" y="0"/>
+          <a:ext cx="0" cy="0"/>
+          <a:chOff x="0" y="0"/>
+          <a:chExt cx="0" cy="0"/>
+        </a:xfrm>
+      </p:grpSpPr>
+      <p:pic>
+        <p:nvPicPr>
           <p:cNvPr id="2" name="图片 18"/>
           <p:cNvPicPr>
             <a:picLocks noChangeAspect="1"/>
@@ -3452,7 +3490,7 @@
 </p:sld>
 </file>
 
-<file path=ppt/slides/slide3.xml><?xml version="1.0" encoding="utf-8"?>
+<file path=ppt/slides/slide4.xml><?xml version="1.0" encoding="utf-8"?>
 <p:sld xmlns:a="http://schemas.openxmlformats.org/drawingml/2006/main" xmlns:r="http://schemas.openxmlformats.org/officeDocument/2006/relationships" xmlns:p="http://schemas.openxmlformats.org/presentationml/2006/main">
   <p:cSld>
     <p:spTree>
@@ -3950,7 +3988,7 @@
 </p:sld>
 </file>
 
-<file path=ppt/slides/slide4.xml><?xml version="1.0" encoding="utf-8"?>
+<file path=ppt/slides/slide5.xml><?xml version="1.0" encoding="utf-8"?>
 <p:sld xmlns:a="http://schemas.openxmlformats.org/drawingml/2006/main" xmlns:r="http://schemas.openxmlformats.org/officeDocument/2006/relationships" xmlns:p="http://schemas.openxmlformats.org/presentationml/2006/main">
   <p:cSld>
     <p:spTree>

</xml_diff>